<commit_message>
Update logo in poster (#11)
* Change to english, change formatting, add EuregJUG logo

* Add poster for 2017-02-08 DDD talk (Michael Ploed)

* Fill in title of 2017-02-08 talk

* Add 2017-03-22 poster (S. Tilkov)

* Update Logo
</commit_message>
<xml_diff>
--- a/poster-2017-03-22/EuregJUG_Whait_what_our_microservices_have_actual_human_users.pptx
+++ b/poster-2017-03-22/EuregJUG_Whait_what_our_microservices_have_actual_human_users.pptx
@@ -241,7 +241,7 @@
           <a:p>
             <a:fld id="{E20EA3BE-DF6A-4E2F-963C-4D49B9CC1399}" type="datetimeFigureOut">
               <a:rPr lang="de-DE" smtClean="0"/>
-              <a:t>13.02.2017</a:t>
+              <a:t>14.02.2017</a:t>
             </a:fld>
             <a:endParaRPr lang="de-DE"/>
           </a:p>
@@ -409,7 +409,7 @@
           <a:p>
             <a:fld id="{E20EA3BE-DF6A-4E2F-963C-4D49B9CC1399}" type="datetimeFigureOut">
               <a:rPr lang="de-DE" smtClean="0"/>
-              <a:t>13.02.2017</a:t>
+              <a:t>14.02.2017</a:t>
             </a:fld>
             <a:endParaRPr lang="de-DE"/>
           </a:p>
@@ -587,7 +587,7 @@
           <a:p>
             <a:fld id="{E20EA3BE-DF6A-4E2F-963C-4D49B9CC1399}" type="datetimeFigureOut">
               <a:rPr lang="de-DE" smtClean="0"/>
-              <a:t>13.02.2017</a:t>
+              <a:t>14.02.2017</a:t>
             </a:fld>
             <a:endParaRPr lang="de-DE"/>
           </a:p>
@@ -755,7 +755,7 @@
           <a:p>
             <a:fld id="{E20EA3BE-DF6A-4E2F-963C-4D49B9CC1399}" type="datetimeFigureOut">
               <a:rPr lang="de-DE" smtClean="0"/>
-              <a:t>13.02.2017</a:t>
+              <a:t>14.02.2017</a:t>
             </a:fld>
             <a:endParaRPr lang="de-DE"/>
           </a:p>
@@ -1000,7 +1000,7 @@
           <a:p>
             <a:fld id="{E20EA3BE-DF6A-4E2F-963C-4D49B9CC1399}" type="datetimeFigureOut">
               <a:rPr lang="de-DE" smtClean="0"/>
-              <a:t>13.02.2017</a:t>
+              <a:t>14.02.2017</a:t>
             </a:fld>
             <a:endParaRPr lang="de-DE"/>
           </a:p>
@@ -1229,7 +1229,7 @@
           <a:p>
             <a:fld id="{E20EA3BE-DF6A-4E2F-963C-4D49B9CC1399}" type="datetimeFigureOut">
               <a:rPr lang="de-DE" smtClean="0"/>
-              <a:t>13.02.2017</a:t>
+              <a:t>14.02.2017</a:t>
             </a:fld>
             <a:endParaRPr lang="de-DE"/>
           </a:p>
@@ -1593,7 +1593,7 @@
           <a:p>
             <a:fld id="{E20EA3BE-DF6A-4E2F-963C-4D49B9CC1399}" type="datetimeFigureOut">
               <a:rPr lang="de-DE" smtClean="0"/>
-              <a:t>13.02.2017</a:t>
+              <a:t>14.02.2017</a:t>
             </a:fld>
             <a:endParaRPr lang="de-DE"/>
           </a:p>
@@ -1710,7 +1710,7 @@
           <a:p>
             <a:fld id="{E20EA3BE-DF6A-4E2F-963C-4D49B9CC1399}" type="datetimeFigureOut">
               <a:rPr lang="de-DE" smtClean="0"/>
-              <a:t>13.02.2017</a:t>
+              <a:t>14.02.2017</a:t>
             </a:fld>
             <a:endParaRPr lang="de-DE"/>
           </a:p>
@@ -1805,7 +1805,7 @@
           <a:p>
             <a:fld id="{E20EA3BE-DF6A-4E2F-963C-4D49B9CC1399}" type="datetimeFigureOut">
               <a:rPr lang="de-DE" smtClean="0"/>
-              <a:t>13.02.2017</a:t>
+              <a:t>14.02.2017</a:t>
             </a:fld>
             <a:endParaRPr lang="de-DE"/>
           </a:p>
@@ -2080,7 +2080,7 @@
           <a:p>
             <a:fld id="{E20EA3BE-DF6A-4E2F-963C-4D49B9CC1399}" type="datetimeFigureOut">
               <a:rPr lang="de-DE" smtClean="0"/>
-              <a:t>13.02.2017</a:t>
+              <a:t>14.02.2017</a:t>
             </a:fld>
             <a:endParaRPr lang="de-DE"/>
           </a:p>
@@ -2332,7 +2332,7 @@
           <a:p>
             <a:fld id="{E20EA3BE-DF6A-4E2F-963C-4D49B9CC1399}" type="datetimeFigureOut">
               <a:rPr lang="de-DE" smtClean="0"/>
-              <a:t>13.02.2017</a:t>
+              <a:t>14.02.2017</a:t>
             </a:fld>
             <a:endParaRPr lang="de-DE"/>
           </a:p>
@@ -2543,7 +2543,7 @@
           <a:p>
             <a:fld id="{E20EA3BE-DF6A-4E2F-963C-4D49B9CC1399}" type="datetimeFigureOut">
               <a:rPr lang="de-DE" smtClean="0"/>
-              <a:t>13.02.2017</a:t>
+              <a:t>14.02.2017</a:t>
             </a:fld>
             <a:endParaRPr lang="de-DE"/>
           </a:p>
@@ -2950,7 +2950,7 @@
       </p:grpSpPr>
       <p:pic>
         <p:nvPicPr>
-          <p:cNvPr id="4" name="Grafik 3"/>
+          <p:cNvPr id="3" name="Grafik 2"/>
           <p:cNvPicPr>
             <a:picLocks noChangeAspect="1"/>
           </p:cNvPicPr>
@@ -2970,8 +2970,8 @@
         </p:blipFill>
         <p:spPr>
           <a:xfrm>
-            <a:off x="10223606" y="8389"/>
-            <a:ext cx="1884503" cy="872455"/>
+            <a:off x="10898961" y="36193"/>
+            <a:ext cx="1055351" cy="1055351"/>
           </a:xfrm>
           <a:prstGeom prst="rect">
             <a:avLst/>

</xml_diff>